<commit_message>
small update to Data sources
</commit_message>
<xml_diff>
--- a/Idea de TFM_v3.pptx
+++ b/Idea de TFM_v3.pptx
@@ -224,7 +224,7 @@
             <a:pPr rtl="0"/>
             <a:fld id="{615FAA28-D333-4D57-AF0E-BDF53B4498B2}" type="datetime1">
               <a:rPr lang="en-GB" smtClean="0"/>
-              <a:t>09/10/2023</a:t>
+              <a:t>12/10/2023</a:t>
             </a:fld>
             <a:endParaRPr lang="en-GB" dirty="0"/>
           </a:p>
@@ -770,7 +770,7 @@
             <a:pPr rtl="0"/>
             <a:fld id="{6D03277C-3F5C-4673-8D79-1738A329ED93}" type="datetime1">
               <a:rPr lang="en-GB" noProof="0" smtClean="0"/>
-              <a:t>09/10/2023</a:t>
+              <a:t>12/10/2023</a:t>
             </a:fld>
             <a:endParaRPr lang="en-GB" noProof="0" dirty="0"/>
           </a:p>
@@ -11526,7 +11526,7 @@
         <p:spPr>
           <a:xfrm>
             <a:off x="545946" y="1158902"/>
-            <a:ext cx="8214006" cy="5434872"/>
+            <a:ext cx="8214006" cy="5164220"/>
           </a:xfrm>
         </p:spPr>
         <p:txBody>
@@ -11604,7 +11604,7 @@
                 <a:ea typeface="Calibri" panose="020F0502020204030204" pitchFamily="34" charset="0"/>
                 <a:cs typeface="Times New Roman" panose="02020603050405020304" pitchFamily="18" charset="0"/>
               </a:rPr>
-              <a:t>Índices Bursátiles, Tipos de cambio, Bonos – Yahoo Finance y Investing.com</a:t>
+              <a:t>Índices Bursátiles, Tipos de cambio – Yahoo Finance y Investing.com</a:t>
             </a:r>
           </a:p>
           <a:p>
@@ -11658,8 +11658,21 @@
                 <a:ea typeface="Calibri" panose="020F0502020204030204" pitchFamily="34" charset="0"/>
                 <a:cs typeface="Times New Roman" panose="02020603050405020304" pitchFamily="18" charset="0"/>
               </a:rPr>
-              <a:t>Web Scrapping desde: Investing.com, Trading Economics y FX Empire. Es posible rellenar la mayoría de los datos no incluidos en otras fuentes.</a:t>
-            </a:r>
+              <a:t>Web Scrapping desde: Investing.com, Trading Economics y FX </a:t>
+            </a:r>
+            <a:r>
+              <a:rPr lang="es-ES" kern="100" dirty="0" err="1">
+                <a:latin typeface="Calibri" panose="020F0502020204030204" pitchFamily="34" charset="0"/>
+                <a:ea typeface="Calibri" panose="020F0502020204030204" pitchFamily="34" charset="0"/>
+                <a:cs typeface="Times New Roman" panose="02020603050405020304" pitchFamily="18" charset="0"/>
+              </a:rPr>
+              <a:t>Empire</a:t>
+            </a:r>
+            <a:endParaRPr lang="es-ES" kern="100" dirty="0">
+              <a:latin typeface="Calibri" panose="020F0502020204030204" pitchFamily="34" charset="0"/>
+              <a:ea typeface="Calibri" panose="020F0502020204030204" pitchFamily="34" charset="0"/>
+              <a:cs typeface="Times New Roman" panose="02020603050405020304" pitchFamily="18" charset="0"/>
+            </a:endParaRPr>
           </a:p>
           <a:p>
             <a:pPr>
@@ -11676,7 +11689,23 @@
                 <a:ea typeface="Calibri" panose="020F0502020204030204" pitchFamily="34" charset="0"/>
                 <a:cs typeface="Times New Roman" panose="02020603050405020304" pitchFamily="18" charset="0"/>
               </a:rPr>
-              <a:t>World Bank – cubre 48 países, pero solo con datos anuales</a:t>
+              <a:t> </a:t>
+            </a:r>
+            <a:r>
+              <a:rPr lang="es-ES" kern="100" dirty="0" err="1">
+                <a:latin typeface="Calibri" panose="020F0502020204030204" pitchFamily="34" charset="0"/>
+                <a:ea typeface="Calibri" panose="020F0502020204030204" pitchFamily="34" charset="0"/>
+                <a:cs typeface="Times New Roman" panose="02020603050405020304" pitchFamily="18" charset="0"/>
+              </a:rPr>
+              <a:t>World</a:t>
+            </a:r>
+            <a:r>
+              <a:rPr lang="es-ES" kern="100" dirty="0">
+                <a:latin typeface="Calibri" panose="020F0502020204030204" pitchFamily="34" charset="0"/>
+                <a:ea typeface="Calibri" panose="020F0502020204030204" pitchFamily="34" charset="0"/>
+                <a:cs typeface="Times New Roman" panose="02020603050405020304" pitchFamily="18" charset="0"/>
+              </a:rPr>
+              <a:t> Bank – cubre 48 países, pero solo con datos anuales</a:t>
             </a:r>
           </a:p>
           <a:p>
@@ -13190,6 +13219,15 @@
 </file>
 
 <file path=customXml/item1.xml><?xml version="1.0" encoding="utf-8"?>
+<p:properties xmlns:p="http://schemas.microsoft.com/office/2006/metadata/properties" xmlns:xsi="http://www.w3.org/2001/XMLSchema-instance" xmlns:pc="http://schemas.microsoft.com/office/infopath/2007/PartnerControls">
+  <documentManagement>
+    <_ip_UnifiedCompliancePolicyUIAction xmlns="http://schemas.microsoft.com/sharepoint/v3" xsi:nil="true"/>
+    <_ip_UnifiedCompliancePolicyProperties xmlns="http://schemas.microsoft.com/sharepoint/v3" xsi:nil="true"/>
+  </documentManagement>
+</p:properties>
+</file>
+
+<file path=customXml/item2.xml><?xml version="1.0" encoding="utf-8"?>
 <ct:contentTypeSchema xmlns:ct="http://schemas.microsoft.com/office/2006/metadata/contentType" xmlns:ma="http://schemas.microsoft.com/office/2006/metadata/properties/metaAttributes" ct:_="" ma:_="" ma:contentTypeName="Document" ma:contentTypeID="0x010100DEEA25CC0A0AC24199CDC46C25B8B0BC" ma:contentTypeVersion="10" ma:contentTypeDescription="Create a new document." ma:contentTypeScope="" ma:versionID="e3b47856d4cf355c0dacb39e1084d14f">
   <xsd:schema xmlns:xsd="http://www.w3.org/2001/XMLSchema" xmlns:xs="http://www.w3.org/2001/XMLSchema" xmlns:p="http://schemas.microsoft.com/office/2006/metadata/properties" xmlns:ns1="http://schemas.microsoft.com/sharepoint/v3" xmlns:ns2="6dc4bcd6-49db-4c07-9060-8acfc67cef9f" xmlns:ns3="fb0879af-3eba-417a-a55a-ffe6dcd6ca77" targetNamespace="http://schemas.microsoft.com/office/2006/metadata/properties" ma:root="true" ma:fieldsID="a845a615265fdb1f7b12cc65ac20ecbd" ns1:_="" ns2:_="" ns3:_="">
     <xsd:import namespace="http://schemas.microsoft.com/sharepoint/v3"/>
@@ -13397,15 +13435,6 @@
 </ct:contentTypeSchema>
 </file>
 
-<file path=customXml/item2.xml><?xml version="1.0" encoding="utf-8"?>
-<p:properties xmlns:p="http://schemas.microsoft.com/office/2006/metadata/properties" xmlns:xsi="http://www.w3.org/2001/XMLSchema-instance" xmlns:pc="http://schemas.microsoft.com/office/infopath/2007/PartnerControls">
-  <documentManagement>
-    <_ip_UnifiedCompliancePolicyUIAction xmlns="http://schemas.microsoft.com/sharepoint/v3" xsi:nil="true"/>
-    <_ip_UnifiedCompliancePolicyProperties xmlns="http://schemas.microsoft.com/sharepoint/v3" xsi:nil="true"/>
-  </documentManagement>
-</p:properties>
-</file>
-
 <file path=customXml/item3.xml><?xml version="1.0" encoding="utf-8"?>
 <?mso-contentType ?>
 <FormTemplates xmlns="http://schemas.microsoft.com/sharepoint/v3/contenttype/forms">
@@ -13416,6 +13445,16 @@
 </file>
 
 <file path=customXml/itemProps1.xml><?xml version="1.0" encoding="utf-8"?>
+<ds:datastoreItem xmlns:ds="http://schemas.openxmlformats.org/officeDocument/2006/customXml" ds:itemID="{E4934E25-8442-49E9-ABDF-3146C4145F3B}">
+  <ds:schemaRefs>
+    <ds:schemaRef ds:uri="http://schemas.microsoft.com/office/2006/metadata/properties"/>
+    <ds:schemaRef ds:uri="http://schemas.microsoft.com/office/infopath/2007/PartnerControls"/>
+    <ds:schemaRef ds:uri="http://schemas.microsoft.com/sharepoint/v3"/>
+  </ds:schemaRefs>
+</ds:datastoreItem>
+</file>
+
+<file path=customXml/itemProps2.xml><?xml version="1.0" encoding="utf-8"?>
 <ds:datastoreItem xmlns:ds="http://schemas.openxmlformats.org/officeDocument/2006/customXml" ds:itemID="{1BBB5711-29E1-4F8E-81A0-7947C57B208A}">
   <ds:schemaRefs>
     <ds:schemaRef ds:uri="http://schemas.microsoft.com/office/2006/metadata/contentType"/>
@@ -13435,16 +13474,6 @@
 </ds:datastoreItem>
 </file>
 
-<file path=customXml/itemProps2.xml><?xml version="1.0" encoding="utf-8"?>
-<ds:datastoreItem xmlns:ds="http://schemas.openxmlformats.org/officeDocument/2006/customXml" ds:itemID="{E4934E25-8442-49E9-ABDF-3146C4145F3B}">
-  <ds:schemaRefs>
-    <ds:schemaRef ds:uri="http://schemas.microsoft.com/office/2006/metadata/properties"/>
-    <ds:schemaRef ds:uri="http://schemas.microsoft.com/office/infopath/2007/PartnerControls"/>
-    <ds:schemaRef ds:uri="http://schemas.microsoft.com/sharepoint/v3"/>
-  </ds:schemaRefs>
-</ds:datastoreItem>
-</file>
-
 <file path=customXml/itemProps3.xml><?xml version="1.0" encoding="utf-8"?>
 <ds:datastoreItem xmlns:ds="http://schemas.openxmlformats.org/officeDocument/2006/customXml" ds:itemID="{F6CB1848-D3E0-4F10-B640-720BE758B85B}">
   <ds:schemaRefs>

</xml_diff>